<commit_message>
L03 Add homework visualisation
</commit_message>
<xml_diff>
--- a/lectures/L03 OOP.pptx
+++ b/lectures/L03 OOP.pptx
@@ -219,7 +219,7 @@
           <a:p>
             <a:fld id="{993087D2-D7E4-604B-A1DA-95483293487E}" type="datetimeFigureOut">
               <a:rPr lang="en-UA" smtClean="0"/>
-              <a:t>30.10.2023</a:t>
+              <a:t>31.10.2023</a:t>
             </a:fld>
             <a:endParaRPr lang="en-UA"/>
           </a:p>
@@ -1185,7 +1185,7 @@
             <a:fld id="{B61BEF0D-F0BB-DE4B-95CE-6DB70DBA9567}" type="datetimeFigureOut">
               <a:rPr lang="en-US" smtClean="0"/>
               <a:pPr/>
-              <a:t>10/30/23</a:t>
+              <a:t>10/31/23</a:t>
             </a:fld>
             <a:endParaRPr lang="en-US" dirty="0"/>
           </a:p>
@@ -1366,7 +1366,7 @@
             <a:fld id="{B61BEF0D-F0BB-DE4B-95CE-6DB70DBA9567}" type="datetimeFigureOut">
               <a:rPr lang="en-US" smtClean="0"/>
               <a:pPr/>
-              <a:t>10/30/23</a:t>
+              <a:t>10/31/23</a:t>
             </a:fld>
             <a:endParaRPr lang="en-US" dirty="0"/>
           </a:p>
@@ -1548,7 +1548,7 @@
             <a:fld id="{B61BEF0D-F0BB-DE4B-95CE-6DB70DBA9567}" type="datetimeFigureOut">
               <a:rPr lang="en-US" smtClean="0"/>
               <a:pPr/>
-              <a:t>10/30/23</a:t>
+              <a:t>10/31/23</a:t>
             </a:fld>
             <a:endParaRPr lang="en-US" dirty="0"/>
           </a:p>
@@ -1720,7 +1720,7 @@
             <a:fld id="{B61BEF0D-F0BB-DE4B-95CE-6DB70DBA9567}" type="datetimeFigureOut">
               <a:rPr lang="en-US" smtClean="0"/>
               <a:pPr/>
-              <a:t>10/30/23</a:t>
+              <a:t>10/31/23</a:t>
             </a:fld>
             <a:endParaRPr lang="en-US" dirty="0"/>
           </a:p>
@@ -2043,7 +2043,7 @@
             <a:fld id="{B61BEF0D-F0BB-DE4B-95CE-6DB70DBA9567}" type="datetimeFigureOut">
               <a:rPr lang="en-US" smtClean="0"/>
               <a:pPr/>
-              <a:t>10/30/23</a:t>
+              <a:t>10/31/23</a:t>
             </a:fld>
             <a:endParaRPr lang="en-US" dirty="0"/>
           </a:p>
@@ -2505,7 +2505,7 @@
             <a:fld id="{B61BEF0D-F0BB-DE4B-95CE-6DB70DBA9567}" type="datetimeFigureOut">
               <a:rPr lang="en-US" smtClean="0"/>
               <a:pPr/>
-              <a:t>10/30/23</a:t>
+              <a:t>10/31/23</a:t>
             </a:fld>
             <a:endParaRPr lang="en-US" dirty="0"/>
           </a:p>
@@ -2918,7 +2918,7 @@
             <a:fld id="{B61BEF0D-F0BB-DE4B-95CE-6DB70DBA9567}" type="datetimeFigureOut">
               <a:rPr lang="en-US" smtClean="0"/>
               <a:pPr/>
-              <a:t>10/30/23</a:t>
+              <a:t>10/31/23</a:t>
             </a:fld>
             <a:endParaRPr lang="en-US" dirty="0"/>
           </a:p>
@@ -3038,7 +3038,7 @@
             <a:fld id="{B61BEF0D-F0BB-DE4B-95CE-6DB70DBA9567}" type="datetimeFigureOut">
               <a:rPr lang="en-US" smtClean="0"/>
               <a:pPr/>
-              <a:t>10/30/23</a:t>
+              <a:t>10/31/23</a:t>
             </a:fld>
             <a:endParaRPr lang="en-US" dirty="0"/>
           </a:p>
@@ -3158,7 +3158,7 @@
             <a:fld id="{B61BEF0D-F0BB-DE4B-95CE-6DB70DBA9567}" type="datetimeFigureOut">
               <a:rPr lang="en-US" smtClean="0"/>
               <a:pPr/>
-              <a:t>10/30/23</a:t>
+              <a:t>10/31/23</a:t>
             </a:fld>
             <a:endParaRPr lang="en-US" dirty="0"/>
           </a:p>
@@ -3518,7 +3518,7 @@
             <a:fld id="{B61BEF0D-F0BB-DE4B-95CE-6DB70DBA9567}" type="datetimeFigureOut">
               <a:rPr lang="en-US" smtClean="0"/>
               <a:pPr/>
-              <a:t>10/30/23</a:t>
+              <a:t>10/31/23</a:t>
             </a:fld>
             <a:endParaRPr lang="en-US" dirty="0"/>
           </a:p>
@@ -4027,7 +4027,7 @@
             <a:fld id="{B61BEF0D-F0BB-DE4B-95CE-6DB70DBA9567}" type="datetimeFigureOut">
               <a:rPr lang="en-US" smtClean="0"/>
               <a:pPr/>
-              <a:t>10/30/23</a:t>
+              <a:t>10/31/23</a:t>
             </a:fld>
             <a:endParaRPr lang="en-US" dirty="0"/>
           </a:p>
@@ -4384,7 +4384,7 @@
             <a:fld id="{B61BEF0D-F0BB-DE4B-95CE-6DB70DBA9567}" type="datetimeFigureOut">
               <a:rPr lang="en-US" smtClean="0"/>
               <a:pPr/>
-              <a:t>10/30/23</a:t>
+              <a:t>10/31/23</a:t>
             </a:fld>
             <a:endParaRPr lang="en-US" dirty="0"/>
           </a:p>
@@ -15910,8 +15910,8 @@
         </p:nvSpPr>
         <p:spPr>
           <a:xfrm>
-            <a:off x="563432" y="2625081"/>
-            <a:ext cx="6904168" cy="3593592"/>
+            <a:off x="295634" y="2466014"/>
+            <a:ext cx="6278877" cy="3593592"/>
           </a:xfrm>
         </p:spPr>
         <p:txBody>
@@ -15940,15 +15940,7 @@
               <a:rPr lang="en-UA" sz="2800" dirty="0">
                 <a:latin typeface="Rockwell" panose="02060603020205020403" pitchFamily="18" charset="77"/>
               </a:rPr>
-              <a:t>Write dynamic system</a:t>
-            </a:r>
-          </a:p>
-          <a:p>
-            <a:r>
-              <a:rPr lang="en-UA" sz="2800" dirty="0">
-                <a:latin typeface="Rockwell" panose="02060603020205020403" pitchFamily="18" charset="77"/>
-              </a:rPr>
-              <a:t>Implement</a:t>
+              <a:t>Write a dynamic system. Implement</a:t>
             </a:r>
             <a:r>
               <a:rPr lang="uk-UA" sz="2800" dirty="0">
@@ -15972,6 +15964,14 @@
                 <a:latin typeface="Rockwell" panose="02060603020205020403" pitchFamily="18" charset="77"/>
               </a:rPr>
               <a:t>Prefer composition. Avoid extension</a:t>
+            </a:r>
+          </a:p>
+          <a:p>
+            <a:r>
+              <a:rPr lang="en-UA" sz="2800" dirty="0">
+                <a:latin typeface="Rockwell" panose="02060603020205020403" pitchFamily="18" charset="77"/>
+              </a:rPr>
+              <a:t>Visualise your solution</a:t>
             </a:r>
           </a:p>
           <a:p>

</xml_diff>